<commit_message>
add story-of-mm and emergent ability in llm
</commit_message>
<xml_diff>
--- a/多模态模型积累/align_before_fuse/素材.pptx
+++ b/多模态模型积累/align_before_fuse/素材.pptx
@@ -107,6 +107,11 @@
       </a:defRPr>
     </a:lvl9pPr>
   </p:defaultTextStyle>
+  <p:extLst>
+    <p:ext uri="{EFAFB233-063F-42B5-8137-9DF3F51BA10A}">
+      <p15:sldGuideLst xmlns:p15="http://schemas.microsoft.com/office/powerpoint/2012/main"/>
+    </p:ext>
+  </p:extLst>
 </p:presentation>
 </file>
 
@@ -257,7 +262,7 @@
           <a:p>
             <a:fld id="{B4994B9A-66C5-BC43-8176-F60B1C2534FE}" type="datetimeFigureOut">
               <a:rPr kumimoji="1" lang="zh-CN" altLang="en-US" smtClean="0"/>
-              <a:t>2022/1/28</a:t>
+              <a:t>2023/1/8</a:t>
             </a:fld>
             <a:endParaRPr kumimoji="1" lang="zh-CN" altLang="en-US"/>
           </a:p>
@@ -455,7 +460,7 @@
           <a:p>
             <a:fld id="{B4994B9A-66C5-BC43-8176-F60B1C2534FE}" type="datetimeFigureOut">
               <a:rPr kumimoji="1" lang="zh-CN" altLang="en-US" smtClean="0"/>
-              <a:t>2022/1/28</a:t>
+              <a:t>2023/1/8</a:t>
             </a:fld>
             <a:endParaRPr kumimoji="1" lang="zh-CN" altLang="en-US"/>
           </a:p>
@@ -663,7 +668,7 @@
           <a:p>
             <a:fld id="{B4994B9A-66C5-BC43-8176-F60B1C2534FE}" type="datetimeFigureOut">
               <a:rPr kumimoji="1" lang="zh-CN" altLang="en-US" smtClean="0"/>
-              <a:t>2022/1/28</a:t>
+              <a:t>2023/1/8</a:t>
             </a:fld>
             <a:endParaRPr kumimoji="1" lang="zh-CN" altLang="en-US"/>
           </a:p>
@@ -861,7 +866,7 @@
           <a:p>
             <a:fld id="{B4994B9A-66C5-BC43-8176-F60B1C2534FE}" type="datetimeFigureOut">
               <a:rPr kumimoji="1" lang="zh-CN" altLang="en-US" smtClean="0"/>
-              <a:t>2022/1/28</a:t>
+              <a:t>2023/1/8</a:t>
             </a:fld>
             <a:endParaRPr kumimoji="1" lang="zh-CN" altLang="en-US"/>
           </a:p>
@@ -1136,7 +1141,7 @@
           <a:p>
             <a:fld id="{B4994B9A-66C5-BC43-8176-F60B1C2534FE}" type="datetimeFigureOut">
               <a:rPr kumimoji="1" lang="zh-CN" altLang="en-US" smtClean="0"/>
-              <a:t>2022/1/28</a:t>
+              <a:t>2023/1/8</a:t>
             </a:fld>
             <a:endParaRPr kumimoji="1" lang="zh-CN" altLang="en-US"/>
           </a:p>
@@ -1401,7 +1406,7 @@
           <a:p>
             <a:fld id="{B4994B9A-66C5-BC43-8176-F60B1C2534FE}" type="datetimeFigureOut">
               <a:rPr kumimoji="1" lang="zh-CN" altLang="en-US" smtClean="0"/>
-              <a:t>2022/1/28</a:t>
+              <a:t>2023/1/8</a:t>
             </a:fld>
             <a:endParaRPr kumimoji="1" lang="zh-CN" altLang="en-US"/>
           </a:p>
@@ -1813,7 +1818,7 @@
           <a:p>
             <a:fld id="{B4994B9A-66C5-BC43-8176-F60B1C2534FE}" type="datetimeFigureOut">
               <a:rPr kumimoji="1" lang="zh-CN" altLang="en-US" smtClean="0"/>
-              <a:t>2022/1/28</a:t>
+              <a:t>2023/1/8</a:t>
             </a:fld>
             <a:endParaRPr kumimoji="1" lang="zh-CN" altLang="en-US"/>
           </a:p>
@@ -1954,7 +1959,7 @@
           <a:p>
             <a:fld id="{B4994B9A-66C5-BC43-8176-F60B1C2534FE}" type="datetimeFigureOut">
               <a:rPr kumimoji="1" lang="zh-CN" altLang="en-US" smtClean="0"/>
-              <a:t>2022/1/28</a:t>
+              <a:t>2023/1/8</a:t>
             </a:fld>
             <a:endParaRPr kumimoji="1" lang="zh-CN" altLang="en-US"/>
           </a:p>
@@ -2067,7 +2072,7 @@
           <a:p>
             <a:fld id="{B4994B9A-66C5-BC43-8176-F60B1C2534FE}" type="datetimeFigureOut">
               <a:rPr kumimoji="1" lang="zh-CN" altLang="en-US" smtClean="0"/>
-              <a:t>2022/1/28</a:t>
+              <a:t>2023/1/8</a:t>
             </a:fld>
             <a:endParaRPr kumimoji="1" lang="zh-CN" altLang="en-US"/>
           </a:p>
@@ -2378,7 +2383,7 @@
           <a:p>
             <a:fld id="{B4994B9A-66C5-BC43-8176-F60B1C2534FE}" type="datetimeFigureOut">
               <a:rPr kumimoji="1" lang="zh-CN" altLang="en-US" smtClean="0"/>
-              <a:t>2022/1/28</a:t>
+              <a:t>2023/1/8</a:t>
             </a:fld>
             <a:endParaRPr kumimoji="1" lang="zh-CN" altLang="en-US"/>
           </a:p>
@@ -2666,7 +2671,7 @@
           <a:p>
             <a:fld id="{B4994B9A-66C5-BC43-8176-F60B1C2534FE}" type="datetimeFigureOut">
               <a:rPr kumimoji="1" lang="zh-CN" altLang="en-US" smtClean="0"/>
-              <a:t>2022/1/28</a:t>
+              <a:t>2023/1/8</a:t>
             </a:fld>
             <a:endParaRPr kumimoji="1" lang="zh-CN" altLang="en-US"/>
           </a:p>
@@ -2907,7 +2912,7 @@
           <a:p>
             <a:fld id="{B4994B9A-66C5-BC43-8176-F60B1C2534FE}" type="datetimeFigureOut">
               <a:rPr kumimoji="1" lang="zh-CN" altLang="en-US" smtClean="0"/>
-              <a:t>2022/1/28</a:t>
+              <a:t>2023/1/8</a:t>
             </a:fld>
             <a:endParaRPr kumimoji="1" lang="zh-CN" altLang="en-US"/>
           </a:p>
@@ -3339,9 +3344,9 @@
         <p:grpSpPr>
           <a:xfrm>
             <a:off x="-1799127" y="214313"/>
-            <a:ext cx="15120952" cy="5991568"/>
+            <a:ext cx="15120952" cy="6015679"/>
             <a:chOff x="-1799127" y="214313"/>
-            <a:chExt cx="15120952" cy="5991568"/>
+            <a:chExt cx="15120952" cy="6015679"/>
           </a:xfrm>
         </p:grpSpPr>
         <p:sp>
@@ -3895,8 +3900,8 @@
           </p:nvSpPr>
           <p:spPr>
             <a:xfrm>
-              <a:off x="2509562" y="5497995"/>
-              <a:ext cx="2774851" cy="707886"/>
+              <a:off x="2070951" y="5522106"/>
+              <a:ext cx="3793029" cy="707886"/>
             </a:xfrm>
             <a:prstGeom prst="rect">
               <a:avLst/>
@@ -3946,8 +3951,8 @@
           </p:nvSpPr>
           <p:spPr>
             <a:xfrm>
-              <a:off x="8875814" y="5497995"/>
-              <a:ext cx="2057766" cy="707886"/>
+              <a:off x="9429686" y="5522106"/>
+              <a:ext cx="3316186" cy="707886"/>
             </a:xfrm>
             <a:prstGeom prst="rect">
               <a:avLst/>
@@ -4016,7 +4021,7 @@
                   <a:latin typeface="Nanum Brush Script" panose="03060600000000000000" pitchFamily="66" charset="-127"/>
                   <a:ea typeface="Nanum Brush Script" panose="03060600000000000000" pitchFamily="66" charset="-127"/>
                 </a:rPr>
-                <a:t>Query</a:t>
+                <a:t>Text</a:t>
               </a:r>
               <a:endParaRPr kumimoji="1" lang="zh-CN" altLang="en-US" sz="4800" dirty="0">
                 <a:latin typeface="Nanum Brush Script" panose="03060600000000000000" pitchFamily="66" charset="-127"/>

</xml_diff>